<commit_message>
finished up the package
</commit_message>
<xml_diff>
--- a/TRFigures.pptx
+++ b/TRFigures.pptx
@@ -8,10 +8,11 @@
     <p:sldId id="256" r:id="rId2"/>
     <p:sldId id="262" r:id="rId3"/>
     <p:sldId id="257" r:id="rId4"/>
-    <p:sldId id="258" r:id="rId5"/>
-    <p:sldId id="259" r:id="rId6"/>
-    <p:sldId id="260" r:id="rId7"/>
-    <p:sldId id="261" r:id="rId8"/>
+    <p:sldId id="263" r:id="rId5"/>
+    <p:sldId id="258" r:id="rId6"/>
+    <p:sldId id="259" r:id="rId7"/>
+    <p:sldId id="260" r:id="rId8"/>
+    <p:sldId id="261" r:id="rId9"/>
   </p:sldIdLst>
   <p:sldSz cx="12192000" cy="6858000"/>
   <p:notesSz cx="6858000" cy="9144000"/>
@@ -123,10 +124,96 @@
   <pc:docChgLst>
     <pc:chgData name="Ryan Taylor" userId="d8e9bb2a620fd165" providerId="LiveId" clId="{75F59A67-119A-47EF-BF0A-974FACE50850}"/>
     <pc:docChg chg="undo redo custSel addSld modSld">
-      <pc:chgData name="Ryan Taylor" userId="d8e9bb2a620fd165" providerId="LiveId" clId="{75F59A67-119A-47EF-BF0A-974FACE50850}" dt="2020-04-22T00:41:42.640" v="1146" actId="164"/>
+      <pc:chgData name="Ryan Taylor" userId="d8e9bb2a620fd165" providerId="LiveId" clId="{75F59A67-119A-47EF-BF0A-974FACE50850}" dt="2020-05-01T04:31:32.645" v="1173"/>
       <pc:docMkLst>
         <pc:docMk/>
       </pc:docMkLst>
+      <pc:sldChg chg="modSp">
+        <pc:chgData name="Ryan Taylor" userId="d8e9bb2a620fd165" providerId="LiveId" clId="{75F59A67-119A-47EF-BF0A-974FACE50850}" dt="2020-05-01T04:28:54.049" v="1151" actId="207"/>
+        <pc:sldMkLst>
+          <pc:docMk/>
+          <pc:sldMk cId="1678964675" sldId="256"/>
+        </pc:sldMkLst>
+        <pc:spChg chg="mod ord">
+          <ac:chgData name="Ryan Taylor" userId="d8e9bb2a620fd165" providerId="LiveId" clId="{75F59A67-119A-47EF-BF0A-974FACE50850}" dt="2020-05-01T04:28:46.060" v="1150" actId="207"/>
+          <ac:spMkLst>
+            <pc:docMk/>
+            <pc:sldMk cId="1678964675" sldId="256"/>
+            <ac:spMk id="3" creationId="{FDFB6919-BCE3-4E1D-A6BB-F2160059AFDC}"/>
+          </ac:spMkLst>
+        </pc:spChg>
+        <pc:spChg chg="mod">
+          <ac:chgData name="Ryan Taylor" userId="d8e9bb2a620fd165" providerId="LiveId" clId="{75F59A67-119A-47EF-BF0A-974FACE50850}" dt="2020-05-01T04:28:54.049" v="1151" actId="207"/>
+          <ac:spMkLst>
+            <pc:docMk/>
+            <pc:sldMk cId="1678964675" sldId="256"/>
+            <ac:spMk id="21" creationId="{659D080D-6145-4E36-A526-57C501BE5C85}"/>
+          </ac:spMkLst>
+        </pc:spChg>
+      </pc:sldChg>
+      <pc:sldChg chg="modSp">
+        <pc:chgData name="Ryan Taylor" userId="d8e9bb2a620fd165" providerId="LiveId" clId="{75F59A67-119A-47EF-BF0A-974FACE50850}" dt="2020-05-01T04:31:22.742" v="1170" actId="1076"/>
+        <pc:sldMkLst>
+          <pc:docMk/>
+          <pc:sldMk cId="1188328832" sldId="257"/>
+        </pc:sldMkLst>
+        <pc:spChg chg="mod ord">
+          <ac:chgData name="Ryan Taylor" userId="d8e9bb2a620fd165" providerId="LiveId" clId="{75F59A67-119A-47EF-BF0A-974FACE50850}" dt="2020-05-01T04:29:28.115" v="1153" actId="166"/>
+          <ac:spMkLst>
+            <pc:docMk/>
+            <pc:sldMk cId="1188328832" sldId="257"/>
+            <ac:spMk id="3" creationId="{FDFB6919-BCE3-4E1D-A6BB-F2160059AFDC}"/>
+          </ac:spMkLst>
+        </pc:spChg>
+        <pc:spChg chg="mod">
+          <ac:chgData name="Ryan Taylor" userId="d8e9bb2a620fd165" providerId="LiveId" clId="{75F59A67-119A-47EF-BF0A-974FACE50850}" dt="2020-05-01T04:31:02.213" v="1165" actId="1076"/>
+          <ac:spMkLst>
+            <pc:docMk/>
+            <pc:sldMk cId="1188328832" sldId="257"/>
+            <ac:spMk id="10" creationId="{45EEFF2B-9F5B-4757-BAF8-E8693E6743CD}"/>
+          </ac:spMkLst>
+        </pc:spChg>
+        <pc:spChg chg="mod">
+          <ac:chgData name="Ryan Taylor" userId="d8e9bb2a620fd165" providerId="LiveId" clId="{75F59A67-119A-47EF-BF0A-974FACE50850}" dt="2020-05-01T04:30:54.061" v="1164" actId="14100"/>
+          <ac:spMkLst>
+            <pc:docMk/>
+            <pc:sldMk cId="1188328832" sldId="257"/>
+            <ac:spMk id="11" creationId="{CD4C1419-BC5C-44FC-AA73-0255B495D99A}"/>
+          </ac:spMkLst>
+        </pc:spChg>
+        <pc:spChg chg="mod">
+          <ac:chgData name="Ryan Taylor" userId="d8e9bb2a620fd165" providerId="LiveId" clId="{75F59A67-119A-47EF-BF0A-974FACE50850}" dt="2020-05-01T04:31:10.700" v="1167" actId="14100"/>
+          <ac:spMkLst>
+            <pc:docMk/>
+            <pc:sldMk cId="1188328832" sldId="257"/>
+            <ac:spMk id="17" creationId="{087173BB-6DA0-4A63-A29E-CFD23B3993B0}"/>
+          </ac:spMkLst>
+        </pc:spChg>
+        <pc:spChg chg="mod">
+          <ac:chgData name="Ryan Taylor" userId="d8e9bb2a620fd165" providerId="LiveId" clId="{75F59A67-119A-47EF-BF0A-974FACE50850}" dt="2020-05-01T04:29:20.190" v="1152" actId="207"/>
+          <ac:spMkLst>
+            <pc:docMk/>
+            <pc:sldMk cId="1188328832" sldId="257"/>
+            <ac:spMk id="21" creationId="{659D080D-6145-4E36-A526-57C501BE5C85}"/>
+          </ac:spMkLst>
+        </pc:spChg>
+        <pc:spChg chg="mod">
+          <ac:chgData name="Ryan Taylor" userId="d8e9bb2a620fd165" providerId="LiveId" clId="{75F59A67-119A-47EF-BF0A-974FACE50850}" dt="2020-05-01T04:30:47.440" v="1162" actId="14100"/>
+          <ac:spMkLst>
+            <pc:docMk/>
+            <pc:sldMk cId="1188328832" sldId="257"/>
+            <ac:spMk id="48" creationId="{72D8FB27-EE6A-428C-BED9-35022A4D5CF4}"/>
+          </ac:spMkLst>
+        </pc:spChg>
+        <pc:cxnChg chg="mod">
+          <ac:chgData name="Ryan Taylor" userId="d8e9bb2a620fd165" providerId="LiveId" clId="{75F59A67-119A-47EF-BF0A-974FACE50850}" dt="2020-05-01T04:31:22.742" v="1170" actId="1076"/>
+          <ac:cxnSpMkLst>
+            <pc:docMk/>
+            <pc:sldMk cId="1188328832" sldId="257"/>
+            <ac:cxnSpMk id="9" creationId="{8258B89F-68D5-4F40-955D-0C596575081C}"/>
+          </ac:cxnSpMkLst>
+        </pc:cxnChg>
+      </pc:sldChg>
       <pc:sldChg chg="addSp delSp modSp add">
         <pc:chgData name="Ryan Taylor" userId="d8e9bb2a620fd165" providerId="LiveId" clId="{75F59A67-119A-47EF-BF0A-974FACE50850}" dt="2020-04-22T00:41:42.640" v="1146" actId="164"/>
         <pc:sldMkLst>
@@ -1342,6 +1429,205 @@
           </ac:cxnSpMkLst>
         </pc:cxnChg>
       </pc:sldChg>
+      <pc:sldChg chg="addSp delSp modSp add">
+        <pc:chgData name="Ryan Taylor" userId="d8e9bb2a620fd165" providerId="LiveId" clId="{75F59A67-119A-47EF-BF0A-974FACE50850}" dt="2020-05-01T04:31:32.645" v="1173"/>
+        <pc:sldMkLst>
+          <pc:docMk/>
+          <pc:sldMk cId="2774898293" sldId="263"/>
+        </pc:sldMkLst>
+        <pc:spChg chg="del">
+          <ac:chgData name="Ryan Taylor" userId="d8e9bb2a620fd165" providerId="LiveId" clId="{75F59A67-119A-47EF-BF0A-974FACE50850}" dt="2020-05-01T04:31:31.122" v="1172" actId="21"/>
+          <ac:spMkLst>
+            <pc:docMk/>
+            <pc:sldMk cId="2774898293" sldId="263"/>
+            <ac:spMk id="3" creationId="{FDFB6919-BCE3-4E1D-A6BB-F2160059AFDC}"/>
+          </ac:spMkLst>
+        </pc:spChg>
+        <pc:spChg chg="del">
+          <ac:chgData name="Ryan Taylor" userId="d8e9bb2a620fd165" providerId="LiveId" clId="{75F59A67-119A-47EF-BF0A-974FACE50850}" dt="2020-05-01T04:31:31.122" v="1172" actId="21"/>
+          <ac:spMkLst>
+            <pc:docMk/>
+            <pc:sldMk cId="2774898293" sldId="263"/>
+            <ac:spMk id="4" creationId="{30BCFF73-4DE9-4405-BD7E-C1020D9BA54A}"/>
+          </ac:spMkLst>
+        </pc:spChg>
+        <pc:spChg chg="add mod">
+          <ac:chgData name="Ryan Taylor" userId="d8e9bb2a620fd165" providerId="LiveId" clId="{75F59A67-119A-47EF-BF0A-974FACE50850}" dt="2020-05-01T04:31:31.122" v="1172" actId="21"/>
+          <ac:spMkLst>
+            <pc:docMk/>
+            <pc:sldMk cId="2774898293" sldId="263"/>
+            <ac:spMk id="6" creationId="{BFBCCB9D-F2DB-477E-8184-DB05E935047E}"/>
+          </ac:spMkLst>
+        </pc:spChg>
+        <pc:spChg chg="del">
+          <ac:chgData name="Ryan Taylor" userId="d8e9bb2a620fd165" providerId="LiveId" clId="{75F59A67-119A-47EF-BF0A-974FACE50850}" dt="2020-05-01T04:31:31.122" v="1172" actId="21"/>
+          <ac:spMkLst>
+            <pc:docMk/>
+            <pc:sldMk cId="2774898293" sldId="263"/>
+            <ac:spMk id="14" creationId="{2B2E6FF1-4EFB-4766-8FD7-44E7950DC35F}"/>
+          </ac:spMkLst>
+        </pc:spChg>
+        <pc:spChg chg="del">
+          <ac:chgData name="Ryan Taylor" userId="d8e9bb2a620fd165" providerId="LiveId" clId="{75F59A67-119A-47EF-BF0A-974FACE50850}" dt="2020-05-01T04:31:31.122" v="1172" actId="21"/>
+          <ac:spMkLst>
+            <pc:docMk/>
+            <pc:sldMk cId="2774898293" sldId="263"/>
+            <ac:spMk id="17" creationId="{087173BB-6DA0-4A63-A29E-CFD23B3993B0}"/>
+          </ac:spMkLst>
+        </pc:spChg>
+        <pc:spChg chg="del">
+          <ac:chgData name="Ryan Taylor" userId="d8e9bb2a620fd165" providerId="LiveId" clId="{75F59A67-119A-47EF-BF0A-974FACE50850}" dt="2020-05-01T04:31:31.122" v="1172" actId="21"/>
+          <ac:spMkLst>
+            <pc:docMk/>
+            <pc:sldMk cId="2774898293" sldId="263"/>
+            <ac:spMk id="21" creationId="{659D080D-6145-4E36-A526-57C501BE5C85}"/>
+          </ac:spMkLst>
+        </pc:spChg>
+        <pc:spChg chg="del">
+          <ac:chgData name="Ryan Taylor" userId="d8e9bb2a620fd165" providerId="LiveId" clId="{75F59A67-119A-47EF-BF0A-974FACE50850}" dt="2020-05-01T04:31:31.122" v="1172" actId="21"/>
+          <ac:spMkLst>
+            <pc:docMk/>
+            <pc:sldMk cId="2774898293" sldId="263"/>
+            <ac:spMk id="23" creationId="{C6538DFD-ED29-4DE5-AFBB-574CA89EDF69}"/>
+          </ac:spMkLst>
+        </pc:spChg>
+        <pc:spChg chg="del">
+          <ac:chgData name="Ryan Taylor" userId="d8e9bb2a620fd165" providerId="LiveId" clId="{75F59A67-119A-47EF-BF0A-974FACE50850}" dt="2020-05-01T04:31:31.122" v="1172" actId="21"/>
+          <ac:spMkLst>
+            <pc:docMk/>
+            <pc:sldMk cId="2774898293" sldId="263"/>
+            <ac:spMk id="45" creationId="{F44BED04-DE49-4958-A0CB-7919AADD118C}"/>
+          </ac:spMkLst>
+        </pc:spChg>
+        <pc:spChg chg="del">
+          <ac:chgData name="Ryan Taylor" userId="d8e9bb2a620fd165" providerId="LiveId" clId="{75F59A67-119A-47EF-BF0A-974FACE50850}" dt="2020-05-01T04:31:31.122" v="1172" actId="21"/>
+          <ac:spMkLst>
+            <pc:docMk/>
+            <pc:sldMk cId="2774898293" sldId="263"/>
+            <ac:spMk id="46" creationId="{1089820A-C4EF-4BF9-A84B-38F130B9A25C}"/>
+          </ac:spMkLst>
+        </pc:spChg>
+        <pc:spChg chg="del">
+          <ac:chgData name="Ryan Taylor" userId="d8e9bb2a620fd165" providerId="LiveId" clId="{75F59A67-119A-47EF-BF0A-974FACE50850}" dt="2020-05-01T04:31:31.122" v="1172" actId="21"/>
+          <ac:spMkLst>
+            <pc:docMk/>
+            <pc:sldMk cId="2774898293" sldId="263"/>
+            <ac:spMk id="81" creationId="{0BDD36D5-F687-4F18-A35D-A18DCDC7D42E}"/>
+          </ac:spMkLst>
+        </pc:spChg>
+        <pc:spChg chg="del">
+          <ac:chgData name="Ryan Taylor" userId="d8e9bb2a620fd165" providerId="LiveId" clId="{75F59A67-119A-47EF-BF0A-974FACE50850}" dt="2020-05-01T04:31:31.122" v="1172" actId="21"/>
+          <ac:spMkLst>
+            <pc:docMk/>
+            <pc:sldMk cId="2774898293" sldId="263"/>
+            <ac:spMk id="90" creationId="{516B770E-68DC-4878-95ED-CBB3EE597A93}"/>
+          </ac:spMkLst>
+        </pc:spChg>
+        <pc:spChg chg="del">
+          <ac:chgData name="Ryan Taylor" userId="d8e9bb2a620fd165" providerId="LiveId" clId="{75F59A67-119A-47EF-BF0A-974FACE50850}" dt="2020-05-01T04:31:31.122" v="1172" actId="21"/>
+          <ac:spMkLst>
+            <pc:docMk/>
+            <pc:sldMk cId="2774898293" sldId="263"/>
+            <ac:spMk id="102" creationId="{1C737CE7-073B-401A-B1CB-EB79DEF28211}"/>
+          </ac:spMkLst>
+        </pc:spChg>
+        <pc:grpChg chg="del">
+          <ac:chgData name="Ryan Taylor" userId="d8e9bb2a620fd165" providerId="LiveId" clId="{75F59A67-119A-47EF-BF0A-974FACE50850}" dt="2020-05-01T04:31:31.122" v="1172" actId="21"/>
+          <ac:grpSpMkLst>
+            <pc:docMk/>
+            <pc:sldMk cId="2774898293" sldId="263"/>
+            <ac:grpSpMk id="5" creationId="{5FA3E979-C240-4D8E-A02A-B3779A455ACC}"/>
+          </ac:grpSpMkLst>
+        </pc:grpChg>
+        <pc:picChg chg="add">
+          <ac:chgData name="Ryan Taylor" userId="d8e9bb2a620fd165" providerId="LiveId" clId="{75F59A67-119A-47EF-BF0A-974FACE50850}" dt="2020-05-01T04:31:32.645" v="1173"/>
+          <ac:picMkLst>
+            <pc:docMk/>
+            <pc:sldMk cId="2774898293" sldId="263"/>
+            <ac:picMk id="7" creationId="{2AAB06A4-5D2C-4609-BA2B-B18BD8667A5F}"/>
+          </ac:picMkLst>
+        </pc:picChg>
+        <pc:cxnChg chg="del">
+          <ac:chgData name="Ryan Taylor" userId="d8e9bb2a620fd165" providerId="LiveId" clId="{75F59A67-119A-47EF-BF0A-974FACE50850}" dt="2020-05-01T04:31:31.122" v="1172" actId="21"/>
+          <ac:cxnSpMkLst>
+            <pc:docMk/>
+            <pc:sldMk cId="2774898293" sldId="263"/>
+            <ac:cxnSpMk id="9" creationId="{8258B89F-68D5-4F40-955D-0C596575081C}"/>
+          </ac:cxnSpMkLst>
+        </pc:cxnChg>
+        <pc:cxnChg chg="del">
+          <ac:chgData name="Ryan Taylor" userId="d8e9bb2a620fd165" providerId="LiveId" clId="{75F59A67-119A-47EF-BF0A-974FACE50850}" dt="2020-05-01T04:31:31.122" v="1172" actId="21"/>
+          <ac:cxnSpMkLst>
+            <pc:docMk/>
+            <pc:sldMk cId="2774898293" sldId="263"/>
+            <ac:cxnSpMk id="16" creationId="{0D001656-48DC-476D-B475-70538230E7D0}"/>
+          </ac:cxnSpMkLst>
+        </pc:cxnChg>
+        <pc:cxnChg chg="del">
+          <ac:chgData name="Ryan Taylor" userId="d8e9bb2a620fd165" providerId="LiveId" clId="{75F59A67-119A-47EF-BF0A-974FACE50850}" dt="2020-05-01T04:31:31.122" v="1172" actId="21"/>
+          <ac:cxnSpMkLst>
+            <pc:docMk/>
+            <pc:sldMk cId="2774898293" sldId="263"/>
+            <ac:cxnSpMk id="39" creationId="{6569B12C-E465-463F-BC7B-73BDE7EF8CDC}"/>
+          </ac:cxnSpMkLst>
+        </pc:cxnChg>
+        <pc:cxnChg chg="del mod">
+          <ac:chgData name="Ryan Taylor" userId="d8e9bb2a620fd165" providerId="LiveId" clId="{75F59A67-119A-47EF-BF0A-974FACE50850}" dt="2020-05-01T04:31:31.122" v="1172" actId="21"/>
+          <ac:cxnSpMkLst>
+            <pc:docMk/>
+            <pc:sldMk cId="2774898293" sldId="263"/>
+            <ac:cxnSpMk id="42" creationId="{477CD4FC-8C6D-467C-934E-DB8855B82F9B}"/>
+          </ac:cxnSpMkLst>
+        </pc:cxnChg>
+        <pc:cxnChg chg="del mod">
+          <ac:chgData name="Ryan Taylor" userId="d8e9bb2a620fd165" providerId="LiveId" clId="{75F59A67-119A-47EF-BF0A-974FACE50850}" dt="2020-05-01T04:31:31.122" v="1172" actId="21"/>
+          <ac:cxnSpMkLst>
+            <pc:docMk/>
+            <pc:sldMk cId="2774898293" sldId="263"/>
+            <ac:cxnSpMk id="52" creationId="{07C07546-E4A7-4ADF-B3F9-6E21B5B78BBD}"/>
+          </ac:cxnSpMkLst>
+        </pc:cxnChg>
+        <pc:cxnChg chg="del mod">
+          <ac:chgData name="Ryan Taylor" userId="d8e9bb2a620fd165" providerId="LiveId" clId="{75F59A67-119A-47EF-BF0A-974FACE50850}" dt="2020-05-01T04:31:31.122" v="1172" actId="21"/>
+          <ac:cxnSpMkLst>
+            <pc:docMk/>
+            <pc:sldMk cId="2774898293" sldId="263"/>
+            <ac:cxnSpMk id="55" creationId="{7F5FBFB8-8A96-41A4-8573-96967C1283F7}"/>
+          </ac:cxnSpMkLst>
+        </pc:cxnChg>
+        <pc:cxnChg chg="del mod">
+          <ac:chgData name="Ryan Taylor" userId="d8e9bb2a620fd165" providerId="LiveId" clId="{75F59A67-119A-47EF-BF0A-974FACE50850}" dt="2020-05-01T04:31:31.122" v="1172" actId="21"/>
+          <ac:cxnSpMkLst>
+            <pc:docMk/>
+            <pc:sldMk cId="2774898293" sldId="263"/>
+            <ac:cxnSpMk id="63" creationId="{8147E5BA-2D2C-47CA-9985-B9DA631BFDC9}"/>
+          </ac:cxnSpMkLst>
+        </pc:cxnChg>
+        <pc:cxnChg chg="del mod">
+          <ac:chgData name="Ryan Taylor" userId="d8e9bb2a620fd165" providerId="LiveId" clId="{75F59A67-119A-47EF-BF0A-974FACE50850}" dt="2020-05-01T04:31:31.122" v="1172" actId="21"/>
+          <ac:cxnSpMkLst>
+            <pc:docMk/>
+            <pc:sldMk cId="2774898293" sldId="263"/>
+            <ac:cxnSpMk id="83" creationId="{CDB901AE-8F30-4E60-9BBA-1E0679944999}"/>
+          </ac:cxnSpMkLst>
+        </pc:cxnChg>
+        <pc:cxnChg chg="del mod">
+          <ac:chgData name="Ryan Taylor" userId="d8e9bb2a620fd165" providerId="LiveId" clId="{75F59A67-119A-47EF-BF0A-974FACE50850}" dt="2020-05-01T04:31:31.122" v="1172" actId="21"/>
+          <ac:cxnSpMkLst>
+            <pc:docMk/>
+            <pc:sldMk cId="2774898293" sldId="263"/>
+            <ac:cxnSpMk id="91" creationId="{10D14D9A-0179-4BA5-A9A5-83E646BDC9A3}"/>
+          </ac:cxnSpMkLst>
+        </pc:cxnChg>
+        <pc:cxnChg chg="del mod">
+          <ac:chgData name="Ryan Taylor" userId="d8e9bb2a620fd165" providerId="LiveId" clId="{75F59A67-119A-47EF-BF0A-974FACE50850}" dt="2020-05-01T04:31:31.122" v="1172" actId="21"/>
+          <ac:cxnSpMkLst>
+            <pc:docMk/>
+            <pc:sldMk cId="2774898293" sldId="263"/>
+            <ac:cxnSpMk id="99" creationId="{6DAA26D7-889C-46DA-97A6-5E019128F7E9}"/>
+          </ac:cxnSpMkLst>
+        </pc:cxnChg>
+      </pc:sldChg>
     </pc:docChg>
   </pc:docChgLst>
 </pc:chgInfo>
@@ -1494,7 +1780,7 @@
           <a:p>
             <a:fld id="{5F8A3AD5-B0D3-4CFC-B7F2-54C9D912026E}" type="datetimeFigureOut">
               <a:rPr lang="en-US" smtClean="0"/>
-              <a:t>4/21/2020</a:t>
+              <a:t>5/1/2020</a:t>
             </a:fld>
             <a:endParaRPr lang="en-US"/>
           </a:p>
@@ -1692,7 +1978,7 @@
           <a:p>
             <a:fld id="{5F8A3AD5-B0D3-4CFC-B7F2-54C9D912026E}" type="datetimeFigureOut">
               <a:rPr lang="en-US" smtClean="0"/>
-              <a:t>4/21/2020</a:t>
+              <a:t>5/1/2020</a:t>
             </a:fld>
             <a:endParaRPr lang="en-US"/>
           </a:p>
@@ -1900,7 +2186,7 @@
           <a:p>
             <a:fld id="{5F8A3AD5-B0D3-4CFC-B7F2-54C9D912026E}" type="datetimeFigureOut">
               <a:rPr lang="en-US" smtClean="0"/>
-              <a:t>4/21/2020</a:t>
+              <a:t>5/1/2020</a:t>
             </a:fld>
             <a:endParaRPr lang="en-US"/>
           </a:p>
@@ -2098,7 +2384,7 @@
           <a:p>
             <a:fld id="{5F8A3AD5-B0D3-4CFC-B7F2-54C9D912026E}" type="datetimeFigureOut">
               <a:rPr lang="en-US" smtClean="0"/>
-              <a:t>4/21/2020</a:t>
+              <a:t>5/1/2020</a:t>
             </a:fld>
             <a:endParaRPr lang="en-US"/>
           </a:p>
@@ -2373,7 +2659,7 @@
           <a:p>
             <a:fld id="{5F8A3AD5-B0D3-4CFC-B7F2-54C9D912026E}" type="datetimeFigureOut">
               <a:rPr lang="en-US" smtClean="0"/>
-              <a:t>4/21/2020</a:t>
+              <a:t>5/1/2020</a:t>
             </a:fld>
             <a:endParaRPr lang="en-US"/>
           </a:p>
@@ -2638,7 +2924,7 @@
           <a:p>
             <a:fld id="{5F8A3AD5-B0D3-4CFC-B7F2-54C9D912026E}" type="datetimeFigureOut">
               <a:rPr lang="en-US" smtClean="0"/>
-              <a:t>4/21/2020</a:t>
+              <a:t>5/1/2020</a:t>
             </a:fld>
             <a:endParaRPr lang="en-US"/>
           </a:p>
@@ -3050,7 +3336,7 @@
           <a:p>
             <a:fld id="{5F8A3AD5-B0D3-4CFC-B7F2-54C9D912026E}" type="datetimeFigureOut">
               <a:rPr lang="en-US" smtClean="0"/>
-              <a:t>4/21/2020</a:t>
+              <a:t>5/1/2020</a:t>
             </a:fld>
             <a:endParaRPr lang="en-US"/>
           </a:p>
@@ -3191,7 +3477,7 @@
           <a:p>
             <a:fld id="{5F8A3AD5-B0D3-4CFC-B7F2-54C9D912026E}" type="datetimeFigureOut">
               <a:rPr lang="en-US" smtClean="0"/>
-              <a:t>4/21/2020</a:t>
+              <a:t>5/1/2020</a:t>
             </a:fld>
             <a:endParaRPr lang="en-US"/>
           </a:p>
@@ -3304,7 +3590,7 @@
           <a:p>
             <a:fld id="{5F8A3AD5-B0D3-4CFC-B7F2-54C9D912026E}" type="datetimeFigureOut">
               <a:rPr lang="en-US" smtClean="0"/>
-              <a:t>4/21/2020</a:t>
+              <a:t>5/1/2020</a:t>
             </a:fld>
             <a:endParaRPr lang="en-US"/>
           </a:p>
@@ -3615,7 +3901,7 @@
           <a:p>
             <a:fld id="{5F8A3AD5-B0D3-4CFC-B7F2-54C9D912026E}" type="datetimeFigureOut">
               <a:rPr lang="en-US" smtClean="0"/>
-              <a:t>4/21/2020</a:t>
+              <a:t>5/1/2020</a:t>
             </a:fld>
             <a:endParaRPr lang="en-US"/>
           </a:p>
@@ -3903,7 +4189,7 @@
           <a:p>
             <a:fld id="{5F8A3AD5-B0D3-4CFC-B7F2-54C9D912026E}" type="datetimeFigureOut">
               <a:rPr lang="en-US" smtClean="0"/>
-              <a:t>4/21/2020</a:t>
+              <a:t>5/1/2020</a:t>
             </a:fld>
             <a:endParaRPr lang="en-US"/>
           </a:p>
@@ -4144,7 +4430,7 @@
           <a:p>
             <a:fld id="{5F8A3AD5-B0D3-4CFC-B7F2-54C9D912026E}" type="datetimeFigureOut">
               <a:rPr lang="en-US" smtClean="0"/>
-              <a:t>4/21/2020</a:t>
+              <a:t>5/1/2020</a:t>
             </a:fld>
             <a:endParaRPr lang="en-US"/>
           </a:p>
@@ -4563,59 +4849,6 @@
       </p:grpSpPr>
       <p:sp>
         <p:nvSpPr>
-          <p:cNvPr id="3" name="Subtitle 2">
-            <a:extLst>
-              <a:ext uri="{FF2B5EF4-FFF2-40B4-BE49-F238E27FC236}">
-                <a16:creationId xmlns:a16="http://schemas.microsoft.com/office/drawing/2014/main" id="{FDFB6919-BCE3-4E1D-A6BB-F2160059AFDC}"/>
-              </a:ext>
-            </a:extLst>
-          </p:cNvPr>
-          <p:cNvSpPr>
-            <a:spLocks noGrp="1"/>
-          </p:cNvSpPr>
-          <p:nvPr>
-            <p:ph type="subTitle" idx="1"/>
-          </p:nvPr>
-        </p:nvSpPr>
-        <p:spPr>
-          <a:xfrm>
-            <a:off x="2098039" y="2887584"/>
-            <a:ext cx="1701800" cy="406477"/>
-          </a:xfrm>
-          <a:prstGeom prst="roundRect">
-            <a:avLst/>
-          </a:prstGeom>
-          <a:ln w="28575"/>
-        </p:spPr>
-        <p:style>
-          <a:lnRef idx="2">
-            <a:schemeClr val="dk1"/>
-          </a:lnRef>
-          <a:fillRef idx="1">
-            <a:schemeClr val="lt1"/>
-          </a:fillRef>
-          <a:effectRef idx="0">
-            <a:schemeClr val="dk1"/>
-          </a:effectRef>
-          <a:fontRef idx="minor">
-            <a:schemeClr val="dk1"/>
-          </a:fontRef>
-        </p:style>
-        <p:txBody>
-          <a:bodyPr anchor="ctr">
-            <a:normAutofit fontScale="92500" lnSpcReduction="10000"/>
-          </a:bodyPr>
-          <a:lstStyle/>
-          <a:p>
-            <a:r>
-              <a:rPr lang="en-US" dirty="0"/>
-              <a:t>Timeseries</a:t>
-            </a:r>
-          </a:p>
-        </p:txBody>
-      </p:sp>
-      <p:sp>
-        <p:nvSpPr>
           <p:cNvPr id="4" name="Subtitle 2">
             <a:extLst>
               <a:ext uri="{FF2B5EF4-FFF2-40B4-BE49-F238E27FC236}">
@@ -5584,6 +5817,12 @@
           <a:prstGeom prst="roundRect">
             <a:avLst/>
           </a:prstGeom>
+          <a:solidFill>
+            <a:schemeClr val="accent1">
+              <a:lumMod val="60000"/>
+              <a:lumOff val="40000"/>
+            </a:schemeClr>
+          </a:solidFill>
           <a:ln w="28575"/>
         </p:spPr>
         <p:style>
@@ -7661,6 +7900,65 @@
             <a:r>
               <a:rPr lang="en-US" dirty="0"/>
               <a:t>Predicted Labels</a:t>
+            </a:r>
+          </a:p>
+        </p:txBody>
+      </p:sp>
+      <p:sp>
+        <p:nvSpPr>
+          <p:cNvPr id="3" name="Subtitle 2">
+            <a:extLst>
+              <a:ext uri="{FF2B5EF4-FFF2-40B4-BE49-F238E27FC236}">
+                <a16:creationId xmlns:a16="http://schemas.microsoft.com/office/drawing/2014/main" id="{FDFB6919-BCE3-4E1D-A6BB-F2160059AFDC}"/>
+              </a:ext>
+            </a:extLst>
+          </p:cNvPr>
+          <p:cNvSpPr>
+            <a:spLocks noGrp="1"/>
+          </p:cNvSpPr>
+          <p:nvPr>
+            <p:ph type="subTitle" idx="1"/>
+          </p:nvPr>
+        </p:nvSpPr>
+        <p:spPr>
+          <a:xfrm>
+            <a:off x="2098039" y="2887584"/>
+            <a:ext cx="1701800" cy="406477"/>
+          </a:xfrm>
+          <a:prstGeom prst="roundRect">
+            <a:avLst/>
+          </a:prstGeom>
+          <a:solidFill>
+            <a:schemeClr val="accent1">
+              <a:lumMod val="60000"/>
+              <a:lumOff val="40000"/>
+            </a:schemeClr>
+          </a:solidFill>
+          <a:ln w="28575"/>
+        </p:spPr>
+        <p:style>
+          <a:lnRef idx="2">
+            <a:schemeClr val="dk1"/>
+          </a:lnRef>
+          <a:fillRef idx="1">
+            <a:schemeClr val="lt1"/>
+          </a:fillRef>
+          <a:effectRef idx="0">
+            <a:schemeClr val="dk1"/>
+          </a:effectRef>
+          <a:fontRef idx="minor">
+            <a:schemeClr val="dk1"/>
+          </a:fontRef>
+        </p:style>
+        <p:txBody>
+          <a:bodyPr anchor="ctr">
+            <a:normAutofit fontScale="92500" lnSpcReduction="10000"/>
+          </a:bodyPr>
+          <a:lstStyle/>
+          <a:p>
+            <a:r>
+              <a:rPr lang="en-US" dirty="0"/>
+              <a:t>Timeseries</a:t>
             </a:r>
           </a:p>
         </p:txBody>
@@ -11812,59 +12110,6 @@
       </p:grpSpPr>
       <p:sp>
         <p:nvSpPr>
-          <p:cNvPr id="3" name="Subtitle 2">
-            <a:extLst>
-              <a:ext uri="{FF2B5EF4-FFF2-40B4-BE49-F238E27FC236}">
-                <a16:creationId xmlns:a16="http://schemas.microsoft.com/office/drawing/2014/main" id="{FDFB6919-BCE3-4E1D-A6BB-F2160059AFDC}"/>
-              </a:ext>
-            </a:extLst>
-          </p:cNvPr>
-          <p:cNvSpPr>
-            <a:spLocks noGrp="1"/>
-          </p:cNvSpPr>
-          <p:nvPr>
-            <p:ph type="subTitle" idx="1"/>
-          </p:nvPr>
-        </p:nvSpPr>
-        <p:spPr>
-          <a:xfrm>
-            <a:off x="1945639" y="5173584"/>
-            <a:ext cx="1701800" cy="406477"/>
-          </a:xfrm>
-          <a:prstGeom prst="roundRect">
-            <a:avLst/>
-          </a:prstGeom>
-          <a:ln w="28575"/>
-        </p:spPr>
-        <p:style>
-          <a:lnRef idx="2">
-            <a:schemeClr val="dk1"/>
-          </a:lnRef>
-          <a:fillRef idx="1">
-            <a:schemeClr val="lt1"/>
-          </a:fillRef>
-          <a:effectRef idx="0">
-            <a:schemeClr val="dk1"/>
-          </a:effectRef>
-          <a:fontRef idx="minor">
-            <a:schemeClr val="dk1"/>
-          </a:fontRef>
-        </p:style>
-        <p:txBody>
-          <a:bodyPr anchor="ctr">
-            <a:normAutofit fontScale="92500" lnSpcReduction="10000"/>
-          </a:bodyPr>
-          <a:lstStyle/>
-          <a:p>
-            <a:r>
-              <a:rPr lang="en-US" dirty="0"/>
-              <a:t>Timeseries</a:t>
-            </a:r>
-          </a:p>
-        </p:txBody>
-      </p:sp>
-      <p:sp>
-        <p:nvSpPr>
           <p:cNvPr id="4" name="Subtitle 2">
             <a:extLst>
               <a:ext uri="{FF2B5EF4-FFF2-40B4-BE49-F238E27FC236}">
@@ -12355,6 +12600,12 @@
           <a:prstGeom prst="roundRect">
             <a:avLst/>
           </a:prstGeom>
+          <a:solidFill>
+            <a:schemeClr val="accent1">
+              <a:lumMod val="60000"/>
+              <a:lumOff val="40000"/>
+            </a:schemeClr>
+          </a:solidFill>
           <a:ln w="28575"/>
         </p:spPr>
         <p:style>
@@ -13291,10 +13542,10 @@
         </p:nvGrpSpPr>
         <p:grpSpPr>
           <a:xfrm>
-            <a:off x="-266881" y="3001003"/>
-            <a:ext cx="1976876" cy="3005965"/>
-            <a:chOff x="-451892" y="715003"/>
-            <a:chExt cx="2339618" cy="3005965"/>
+            <a:off x="-475737" y="3001003"/>
+            <a:ext cx="2047674" cy="3011970"/>
+            <a:chOff x="-699072" y="715003"/>
+            <a:chExt cx="2423407" cy="3011970"/>
           </a:xfrm>
         </p:grpSpPr>
         <p:sp>
@@ -13313,8 +13564,8 @@
           </p:nvSpPr>
           <p:spPr>
             <a:xfrm>
-              <a:off x="-27443" y="1902741"/>
-              <a:ext cx="1751787" cy="655002"/>
+              <a:off x="-27442" y="1936699"/>
+              <a:ext cx="1751773" cy="655002"/>
             </a:xfrm>
             <a:prstGeom prst="rect">
               <a:avLst/>
@@ -13517,8 +13768,8 @@
           </p:nvSpPr>
           <p:spPr>
             <a:xfrm>
-              <a:off x="-451892" y="3065966"/>
-              <a:ext cx="2339618" cy="655002"/>
+              <a:off x="-699072" y="3071971"/>
+              <a:ext cx="2423402" cy="655002"/>
             </a:xfrm>
             <a:prstGeom prst="rect">
               <a:avLst/>
@@ -13696,7 +13947,7 @@
               <a:pPr algn="r"/>
               <a:r>
                 <a:rPr lang="en-US" b="1" dirty="0"/>
-                <a:t>Labeled Data</a:t>
+                <a:t>Data</a:t>
               </a:r>
             </a:p>
           </p:txBody>
@@ -13718,7 +13969,7 @@
           <p:spPr>
             <a:xfrm>
               <a:off x="45731" y="715003"/>
-              <a:ext cx="1557008" cy="655002"/>
+              <a:ext cx="1678604" cy="655002"/>
             </a:xfrm>
             <a:prstGeom prst="rect">
               <a:avLst/>
@@ -13904,7 +14155,7 @@
               </a:r>
             </a:p>
             <a:p>
-              <a:pPr algn="l"/>
+              <a:pPr algn="r"/>
               <a:endParaRPr lang="en-US" dirty="0"/>
             </a:p>
           </p:txBody>
@@ -14843,8 +15094,8 @@
         </p:nvCxnSpPr>
         <p:spPr>
           <a:xfrm>
-            <a:off x="1688783" y="2286000"/>
-            <a:ext cx="0" cy="4196451"/>
+            <a:off x="1708034" y="2629005"/>
+            <a:ext cx="0" cy="3462944"/>
           </a:xfrm>
           <a:prstGeom prst="line">
             <a:avLst/>
@@ -14879,8 +15130,8 @@
         </p:nvSpPr>
         <p:spPr>
           <a:xfrm>
-            <a:off x="-139700" y="2205793"/>
-            <a:ext cx="12471400" cy="4385507"/>
+            <a:off x="0" y="2286000"/>
+            <a:ext cx="12331700" cy="4196452"/>
           </a:xfrm>
           <a:prstGeom prst="roundRect">
             <a:avLst/>
@@ -14917,6 +15168,65 @@
           </a:p>
         </p:txBody>
       </p:sp>
+      <p:sp>
+        <p:nvSpPr>
+          <p:cNvPr id="3" name="Subtitle 2">
+            <a:extLst>
+              <a:ext uri="{FF2B5EF4-FFF2-40B4-BE49-F238E27FC236}">
+                <a16:creationId xmlns:a16="http://schemas.microsoft.com/office/drawing/2014/main" id="{FDFB6919-BCE3-4E1D-A6BB-F2160059AFDC}"/>
+              </a:ext>
+            </a:extLst>
+          </p:cNvPr>
+          <p:cNvSpPr>
+            <a:spLocks noGrp="1"/>
+          </p:cNvSpPr>
+          <p:nvPr>
+            <p:ph type="subTitle" idx="1"/>
+          </p:nvPr>
+        </p:nvSpPr>
+        <p:spPr>
+          <a:xfrm>
+            <a:off x="1945639" y="5173584"/>
+            <a:ext cx="1701800" cy="406477"/>
+          </a:xfrm>
+          <a:prstGeom prst="roundRect">
+            <a:avLst/>
+          </a:prstGeom>
+          <a:solidFill>
+            <a:schemeClr val="accent1">
+              <a:lumMod val="60000"/>
+              <a:lumOff val="40000"/>
+            </a:schemeClr>
+          </a:solidFill>
+          <a:ln w="28575"/>
+        </p:spPr>
+        <p:style>
+          <a:lnRef idx="2">
+            <a:schemeClr val="dk1"/>
+          </a:lnRef>
+          <a:fillRef idx="1">
+            <a:schemeClr val="lt1"/>
+          </a:fillRef>
+          <a:effectRef idx="0">
+            <a:schemeClr val="dk1"/>
+          </a:effectRef>
+          <a:fontRef idx="minor">
+            <a:schemeClr val="dk1"/>
+          </a:fontRef>
+        </p:style>
+        <p:txBody>
+          <a:bodyPr anchor="ctr">
+            <a:normAutofit fontScale="92500" lnSpcReduction="10000"/>
+          </a:bodyPr>
+          <a:lstStyle/>
+          <a:p>
+            <a:r>
+              <a:rPr lang="en-US" dirty="0"/>
+              <a:t>Timeseries</a:t>
+            </a:r>
+          </a:p>
+        </p:txBody>
+      </p:sp>
     </p:spTree>
     <p:extLst>
       <p:ext uri="{BB962C8B-B14F-4D97-AF65-F5344CB8AC3E}">
@@ -14931,6 +15241,91 @@
 </file>
 
 <file path=ppt/slides/slide4.xml><?xml version="1.0" encoding="utf-8"?>
+<p:sld xmlns:a="http://schemas.openxmlformats.org/drawingml/2006/main" xmlns:r="http://schemas.openxmlformats.org/officeDocument/2006/relationships" xmlns:p="http://schemas.openxmlformats.org/presentationml/2006/main">
+  <p:cSld>
+    <p:spTree>
+      <p:nvGrpSpPr>
+        <p:cNvPr id="1" name=""/>
+        <p:cNvGrpSpPr/>
+        <p:nvPr/>
+      </p:nvGrpSpPr>
+      <p:grpSpPr>
+        <a:xfrm>
+          <a:off x="0" y="0"/>
+          <a:ext cx="0" cy="0"/>
+          <a:chOff x="0" y="0"/>
+          <a:chExt cx="0" cy="0"/>
+        </a:xfrm>
+      </p:grpSpPr>
+      <p:sp>
+        <p:nvSpPr>
+          <p:cNvPr id="6" name="Subtitle 5">
+            <a:extLst>
+              <a:ext uri="{FF2B5EF4-FFF2-40B4-BE49-F238E27FC236}">
+                <a16:creationId xmlns:a16="http://schemas.microsoft.com/office/drawing/2014/main" id="{BFBCCB9D-F2DB-477E-8184-DB05E935047E}"/>
+              </a:ext>
+            </a:extLst>
+          </p:cNvPr>
+          <p:cNvSpPr>
+            <a:spLocks noGrp="1"/>
+          </p:cNvSpPr>
+          <p:nvPr>
+            <p:ph type="subTitle" idx="1"/>
+          </p:nvPr>
+        </p:nvSpPr>
+        <p:spPr/>
+        <p:txBody>
+          <a:bodyPr/>
+          <a:lstStyle/>
+          <a:p>
+            <a:endParaRPr lang="en-US"/>
+          </a:p>
+        </p:txBody>
+      </p:sp>
+      <p:pic>
+        <p:nvPicPr>
+          <p:cNvPr id="7" name="Picture 6">
+            <a:extLst>
+              <a:ext uri="{FF2B5EF4-FFF2-40B4-BE49-F238E27FC236}">
+                <a16:creationId xmlns:a16="http://schemas.microsoft.com/office/drawing/2014/main" id="{2AAB06A4-5D2C-4609-BA2B-B18BD8667A5F}"/>
+              </a:ext>
+            </a:extLst>
+          </p:cNvPr>
+          <p:cNvPicPr>
+            <a:picLocks noChangeAspect="1"/>
+          </p:cNvPicPr>
+          <p:nvPr/>
+        </p:nvPicPr>
+        <p:blipFill>
+          <a:blip r:embed="rId2"/>
+          <a:stretch>
+            <a:fillRect/>
+          </a:stretch>
+        </p:blipFill>
+        <p:spPr>
+          <a:xfrm>
+            <a:off x="0" y="1401820"/>
+            <a:ext cx="12192000" cy="4054360"/>
+          </a:xfrm>
+          <a:prstGeom prst="rect">
+            <a:avLst/>
+          </a:prstGeom>
+        </p:spPr>
+      </p:pic>
+    </p:spTree>
+    <p:extLst>
+      <p:ext uri="{BB962C8B-B14F-4D97-AF65-F5344CB8AC3E}">
+        <p14:creationId xmlns:p14="http://schemas.microsoft.com/office/powerpoint/2010/main" val="2774898293"/>
+      </p:ext>
+    </p:extLst>
+  </p:cSld>
+  <p:clrMapOvr>
+    <a:masterClrMapping/>
+  </p:clrMapOvr>
+</p:sld>
+</file>
+
+<file path=ppt/slides/slide5.xml><?xml version="1.0" encoding="utf-8"?>
 <p:sld xmlns:a="http://schemas.openxmlformats.org/drawingml/2006/main" xmlns:r="http://schemas.openxmlformats.org/officeDocument/2006/relationships" xmlns:p="http://schemas.openxmlformats.org/presentationml/2006/main">
   <p:cSld>
     <p:spTree>
@@ -16704,7 +17099,7 @@
 </p:sld>
 </file>
 
-<file path=ppt/slides/slide5.xml><?xml version="1.0" encoding="utf-8"?>
+<file path=ppt/slides/slide6.xml><?xml version="1.0" encoding="utf-8"?>
 <p:sld xmlns:a="http://schemas.openxmlformats.org/drawingml/2006/main" xmlns:r="http://schemas.openxmlformats.org/officeDocument/2006/relationships" xmlns:p="http://schemas.openxmlformats.org/presentationml/2006/main">
   <p:cSld>
     <p:spTree>
@@ -17345,7 +17740,7 @@
 </p:sld>
 </file>
 
-<file path=ppt/slides/slide6.xml><?xml version="1.0" encoding="utf-8"?>
+<file path=ppt/slides/slide7.xml><?xml version="1.0" encoding="utf-8"?>
 <p:sld xmlns:a="http://schemas.openxmlformats.org/drawingml/2006/main" xmlns:r="http://schemas.openxmlformats.org/officeDocument/2006/relationships" xmlns:p="http://schemas.openxmlformats.org/presentationml/2006/main">
   <p:cSld>
     <p:spTree>
@@ -17435,7 +17830,7 @@
 </p:sld>
 </file>
 
-<file path=ppt/slides/slide7.xml><?xml version="1.0" encoding="utf-8"?>
+<file path=ppt/slides/slide8.xml><?xml version="1.0" encoding="utf-8"?>
 <p:sld xmlns:a="http://schemas.openxmlformats.org/drawingml/2006/main" xmlns:r="http://schemas.openxmlformats.org/officeDocument/2006/relationships" xmlns:p="http://schemas.openxmlformats.org/presentationml/2006/main">
   <p:cSld>
     <p:spTree>

</xml_diff>